<commit_message>
adding "makefile rule" section to PowerPoint
</commit_message>
<xml_diff>
--- a/ArchSW-docs/The Fuck.pptx
+++ b/ArchSW-docs/The Fuck.pptx
@@ -189,7 +189,7 @@
           <a:noFill/>
           <a:extLst>
             <a:ext uri="{909E8E84-426E-40dd-AFC4-6F175D3DCCD1}">
-              <a14:hiddenFill xmlns="" xmlns:a14="http://schemas.microsoft.com/office/drawing/2010/main">
+              <a14:hiddenFill xmlns:a14="http://schemas.microsoft.com/office/drawing/2010/main" xmlns="">
                 <a:solidFill>
                   <a:srgbClr val="FFFFFF"/>
                 </a:solidFill>
@@ -248,7 +248,7 @@
             </a:ln>
             <a:extLst>
               <a:ext uri="{91240B29-F687-4f45-9708-019B960494DF}">
-                <a14:hiddenLine xmlns="" xmlns:a14="http://schemas.microsoft.com/office/drawing/2010/main" w="9525">
+                <a14:hiddenLine xmlns:a14="http://schemas.microsoft.com/office/drawing/2010/main" xmlns="" w="9525">
                   <a:solidFill>
                     <a:srgbClr val="000000"/>
                   </a:solidFill>
@@ -338,7 +338,7 @@
             </a:ln>
             <a:extLst>
               <a:ext uri="{91240B29-F687-4f45-9708-019B960494DF}">
-                <a14:hiddenLine xmlns="" xmlns:a14="http://schemas.microsoft.com/office/drawing/2010/main" w="9525">
+                <a14:hiddenLine xmlns:a14="http://schemas.microsoft.com/office/drawing/2010/main" xmlns="" w="9525">
                   <a:solidFill>
                     <a:srgbClr val="000000"/>
                   </a:solidFill>
@@ -428,7 +428,7 @@
             </a:ln>
             <a:extLst>
               <a:ext uri="{91240B29-F687-4f45-9708-019B960494DF}">
-                <a14:hiddenLine xmlns="" xmlns:a14="http://schemas.microsoft.com/office/drawing/2010/main" w="9525">
+                <a14:hiddenLine xmlns:a14="http://schemas.microsoft.com/office/drawing/2010/main" xmlns="" w="9525">
                   <a:solidFill>
                     <a:srgbClr val="000000"/>
                   </a:solidFill>
@@ -462,7 +462,7 @@
             </a:ln>
             <a:extLst>
               <a:ext uri="{91240B29-F687-4f45-9708-019B960494DF}">
-                <a14:hiddenLine xmlns="" xmlns:a14="http://schemas.microsoft.com/office/drawing/2010/main" w="9525">
+                <a14:hiddenLine xmlns:a14="http://schemas.microsoft.com/office/drawing/2010/main" xmlns="" w="9525">
                   <a:solidFill>
                     <a:srgbClr val="000000"/>
                   </a:solidFill>
@@ -552,7 +552,7 @@
             </a:ln>
             <a:extLst>
               <a:ext uri="{91240B29-F687-4f45-9708-019B960494DF}">
-                <a14:hiddenLine xmlns="" xmlns:a14="http://schemas.microsoft.com/office/drawing/2010/main" w="9525">
+                <a14:hiddenLine xmlns:a14="http://schemas.microsoft.com/office/drawing/2010/main" xmlns="" w="9525">
                   <a:solidFill>
                     <a:srgbClr val="000000"/>
                   </a:solidFill>
@@ -614,7 +614,7 @@
             </a:ln>
             <a:extLst>
               <a:ext uri="{91240B29-F687-4f45-9708-019B960494DF}">
-                <a14:hiddenLine xmlns="" xmlns:a14="http://schemas.microsoft.com/office/drawing/2010/main" w="9525">
+                <a14:hiddenLine xmlns:a14="http://schemas.microsoft.com/office/drawing/2010/main" xmlns="" w="9525">
                   <a:solidFill>
                     <a:srgbClr val="000000"/>
                   </a:solidFill>
@@ -676,7 +676,7 @@
             </a:ln>
             <a:extLst>
               <a:ext uri="{91240B29-F687-4f45-9708-019B960494DF}">
-                <a14:hiddenLine xmlns="" xmlns:a14="http://schemas.microsoft.com/office/drawing/2010/main" w="9525">
+                <a14:hiddenLine xmlns:a14="http://schemas.microsoft.com/office/drawing/2010/main" xmlns="" w="9525">
                   <a:solidFill>
                     <a:srgbClr val="000000"/>
                   </a:solidFill>
@@ -766,7 +766,7 @@
             </a:ln>
             <a:extLst>
               <a:ext uri="{91240B29-F687-4f45-9708-019B960494DF}">
-                <a14:hiddenLine xmlns="" xmlns:a14="http://schemas.microsoft.com/office/drawing/2010/main" w="9525">
+                <a14:hiddenLine xmlns:a14="http://schemas.microsoft.com/office/drawing/2010/main" xmlns="" w="9525">
                   <a:solidFill>
                     <a:srgbClr val="000000"/>
                   </a:solidFill>
@@ -828,7 +828,7 @@
             </a:ln>
             <a:extLst>
               <a:ext uri="{91240B29-F687-4f45-9708-019B960494DF}">
-                <a14:hiddenLine xmlns="" xmlns:a14="http://schemas.microsoft.com/office/drawing/2010/main" w="9525">
+                <a14:hiddenLine xmlns:a14="http://schemas.microsoft.com/office/drawing/2010/main" xmlns="" w="9525">
                   <a:solidFill>
                     <a:srgbClr val="000000"/>
                   </a:solidFill>
@@ -890,7 +890,7 @@
             </a:ln>
             <a:extLst>
               <a:ext uri="{91240B29-F687-4f45-9708-019B960494DF}">
-                <a14:hiddenLine xmlns="" xmlns:a14="http://schemas.microsoft.com/office/drawing/2010/main" w="9525">
+                <a14:hiddenLine xmlns:a14="http://schemas.microsoft.com/office/drawing/2010/main" xmlns="" w="9525">
                   <a:solidFill>
                     <a:srgbClr val="000000"/>
                   </a:solidFill>
@@ -980,7 +980,7 @@
             </a:ln>
             <a:extLst>
               <a:ext uri="{91240B29-F687-4f45-9708-019B960494DF}">
-                <a14:hiddenLine xmlns="" xmlns:a14="http://schemas.microsoft.com/office/drawing/2010/main" w="9525">
+                <a14:hiddenLine xmlns:a14="http://schemas.microsoft.com/office/drawing/2010/main" xmlns="" w="9525">
                   <a:solidFill>
                     <a:srgbClr val="000000"/>
                   </a:solidFill>
@@ -1070,7 +1070,7 @@
             </a:ln>
             <a:extLst>
               <a:ext uri="{91240B29-F687-4f45-9708-019B960494DF}">
-                <a14:hiddenLine xmlns="" xmlns:a14="http://schemas.microsoft.com/office/drawing/2010/main" w="9525">
+                <a14:hiddenLine xmlns:a14="http://schemas.microsoft.com/office/drawing/2010/main" xmlns="" w="9525">
                   <a:solidFill>
                     <a:srgbClr val="000000"/>
                   </a:solidFill>
@@ -1132,7 +1132,7 @@
             </a:ln>
             <a:extLst>
               <a:ext uri="{91240B29-F687-4f45-9708-019B960494DF}">
-                <a14:hiddenLine xmlns="" xmlns:a14="http://schemas.microsoft.com/office/drawing/2010/main" w="9525">
+                <a14:hiddenLine xmlns:a14="http://schemas.microsoft.com/office/drawing/2010/main" xmlns="" w="9525">
                   <a:solidFill>
                     <a:srgbClr val="000000"/>
                   </a:solidFill>
@@ -1242,7 +1242,7 @@
             </a:ln>
             <a:extLst>
               <a:ext uri="{91240B29-F687-4f45-9708-019B960494DF}">
-                <a14:hiddenLine xmlns="" xmlns:a14="http://schemas.microsoft.com/office/drawing/2010/main" w="9525">
+                <a14:hiddenLine xmlns:a14="http://schemas.microsoft.com/office/drawing/2010/main" xmlns="" w="9525">
                   <a:solidFill>
                     <a:srgbClr val="000000"/>
                   </a:solidFill>
@@ -1304,7 +1304,7 @@
             </a:ln>
             <a:extLst>
               <a:ext uri="{91240B29-F687-4f45-9708-019B960494DF}">
-                <a14:hiddenLine xmlns="" xmlns:a14="http://schemas.microsoft.com/office/drawing/2010/main" w="9525">
+                <a14:hiddenLine xmlns:a14="http://schemas.microsoft.com/office/drawing/2010/main" xmlns="" w="9525">
                   <a:solidFill>
                     <a:srgbClr val="000000"/>
                   </a:solidFill>
@@ -1394,7 +1394,7 @@
             </a:ln>
             <a:extLst>
               <a:ext uri="{91240B29-F687-4f45-9708-019B960494DF}">
-                <a14:hiddenLine xmlns="" xmlns:a14="http://schemas.microsoft.com/office/drawing/2010/main" w="9525">
+                <a14:hiddenLine xmlns:a14="http://schemas.microsoft.com/office/drawing/2010/main" xmlns="" w="9525">
                   <a:solidFill>
                     <a:srgbClr val="000000"/>
                   </a:solidFill>
@@ -1484,7 +1484,7 @@
             </a:ln>
             <a:extLst>
               <a:ext uri="{91240B29-F687-4f45-9708-019B960494DF}">
-                <a14:hiddenLine xmlns="" xmlns:a14="http://schemas.microsoft.com/office/drawing/2010/main" w="9525">
+                <a14:hiddenLine xmlns:a14="http://schemas.microsoft.com/office/drawing/2010/main" xmlns="" w="9525">
                   <a:solidFill>
                     <a:srgbClr val="000000"/>
                   </a:solidFill>
@@ -1546,7 +1546,7 @@
             </a:ln>
             <a:extLst>
               <a:ext uri="{91240B29-F687-4f45-9708-019B960494DF}">
-                <a14:hiddenLine xmlns="" xmlns:a14="http://schemas.microsoft.com/office/drawing/2010/main" w="9525">
+                <a14:hiddenLine xmlns:a14="http://schemas.microsoft.com/office/drawing/2010/main" xmlns="" w="9525">
                   <a:solidFill>
                     <a:srgbClr val="000000"/>
                   </a:solidFill>
@@ -1636,7 +1636,7 @@
             </a:ln>
             <a:extLst>
               <a:ext uri="{91240B29-F687-4f45-9708-019B960494DF}">
-                <a14:hiddenLine xmlns="" xmlns:a14="http://schemas.microsoft.com/office/drawing/2010/main" w="9525">
+                <a14:hiddenLine xmlns:a14="http://schemas.microsoft.com/office/drawing/2010/main" xmlns="" w="9525">
                   <a:solidFill>
                     <a:srgbClr val="000000"/>
                   </a:solidFill>
@@ -1726,7 +1726,7 @@
             </a:ln>
             <a:extLst>
               <a:ext uri="{91240B29-F687-4f45-9708-019B960494DF}">
-                <a14:hiddenLine xmlns="" xmlns:a14="http://schemas.microsoft.com/office/drawing/2010/main" w="9525">
+                <a14:hiddenLine xmlns:a14="http://schemas.microsoft.com/office/drawing/2010/main" xmlns="" w="9525">
                   <a:solidFill>
                     <a:srgbClr val="000000"/>
                   </a:solidFill>
@@ -1782,7 +1782,7 @@
             </a:ln>
             <a:extLst>
               <a:ext uri="{91240B29-F687-4f45-9708-019B960494DF}">
-                <a14:hiddenLine xmlns="" xmlns:a14="http://schemas.microsoft.com/office/drawing/2010/main" w="9525">
+                <a14:hiddenLine xmlns:a14="http://schemas.microsoft.com/office/drawing/2010/main" xmlns="" w="9525">
                   <a:solidFill>
                     <a:srgbClr val="000000"/>
                   </a:solidFill>
@@ -1872,7 +1872,7 @@
             </a:ln>
             <a:extLst>
               <a:ext uri="{91240B29-F687-4f45-9708-019B960494DF}">
-                <a14:hiddenLine xmlns="" xmlns:a14="http://schemas.microsoft.com/office/drawing/2010/main" w="9525">
+                <a14:hiddenLine xmlns:a14="http://schemas.microsoft.com/office/drawing/2010/main" xmlns="" w="9525">
                   <a:solidFill>
                     <a:srgbClr val="000000"/>
                   </a:solidFill>
@@ -1928,7 +1928,7 @@
             </a:ln>
             <a:extLst>
               <a:ext uri="{91240B29-F687-4f45-9708-019B960494DF}">
-                <a14:hiddenLine xmlns="" xmlns:a14="http://schemas.microsoft.com/office/drawing/2010/main" w="9525">
+                <a14:hiddenLine xmlns:a14="http://schemas.microsoft.com/office/drawing/2010/main" xmlns="" w="9525">
                   <a:solidFill>
                     <a:srgbClr val="000000"/>
                   </a:solidFill>
@@ -2018,7 +2018,7 @@
             </a:ln>
             <a:extLst>
               <a:ext uri="{91240B29-F687-4f45-9708-019B960494DF}">
-                <a14:hiddenLine xmlns="" xmlns:a14="http://schemas.microsoft.com/office/drawing/2010/main" w="9525">
+                <a14:hiddenLine xmlns:a14="http://schemas.microsoft.com/office/drawing/2010/main" xmlns="" w="9525">
                   <a:solidFill>
                     <a:srgbClr val="000000"/>
                   </a:solidFill>
@@ -2086,7 +2086,7 @@
             </a:ln>
             <a:extLst>
               <a:ext uri="{91240B29-F687-4f45-9708-019B960494DF}">
-                <a14:hiddenLine xmlns="" xmlns:a14="http://schemas.microsoft.com/office/drawing/2010/main" w="9525">
+                <a14:hiddenLine xmlns:a14="http://schemas.microsoft.com/office/drawing/2010/main" xmlns="" w="9525">
                   <a:solidFill>
                     <a:srgbClr val="000000"/>
                   </a:solidFill>
@@ -2176,7 +2176,7 @@
             </a:ln>
             <a:extLst>
               <a:ext uri="{91240B29-F687-4f45-9708-019B960494DF}">
-                <a14:hiddenLine xmlns="" xmlns:a14="http://schemas.microsoft.com/office/drawing/2010/main" w="9525">
+                <a14:hiddenLine xmlns:a14="http://schemas.microsoft.com/office/drawing/2010/main" xmlns="" w="9525">
                   <a:solidFill>
                     <a:srgbClr val="000000"/>
                   </a:solidFill>
@@ -2244,7 +2244,7 @@
             </a:ln>
             <a:extLst>
               <a:ext uri="{91240B29-F687-4f45-9708-019B960494DF}">
-                <a14:hiddenLine xmlns="" xmlns:a14="http://schemas.microsoft.com/office/drawing/2010/main" w="9525">
+                <a14:hiddenLine xmlns:a14="http://schemas.microsoft.com/office/drawing/2010/main" xmlns="" w="9525">
                   <a:solidFill>
                     <a:srgbClr val="000000"/>
                   </a:solidFill>
@@ -2334,7 +2334,7 @@
             </a:ln>
             <a:extLst>
               <a:ext uri="{91240B29-F687-4f45-9708-019B960494DF}">
-                <a14:hiddenLine xmlns="" xmlns:a14="http://schemas.microsoft.com/office/drawing/2010/main" w="9525">
+                <a14:hiddenLine xmlns:a14="http://schemas.microsoft.com/office/drawing/2010/main" xmlns="" w="9525">
                   <a:solidFill>
                     <a:srgbClr val="000000"/>
                   </a:solidFill>
@@ -2368,7 +2368,7 @@
             </a:ln>
             <a:extLst>
               <a:ext uri="{91240B29-F687-4f45-9708-019B960494DF}">
-                <a14:hiddenLine xmlns="" xmlns:a14="http://schemas.microsoft.com/office/drawing/2010/main" w="9525">
+                <a14:hiddenLine xmlns:a14="http://schemas.microsoft.com/office/drawing/2010/main" xmlns="" w="9525">
                   <a:solidFill>
                     <a:srgbClr val="000000"/>
                   </a:solidFill>
@@ -2458,7 +2458,7 @@
             </a:ln>
             <a:extLst>
               <a:ext uri="{91240B29-F687-4f45-9708-019B960494DF}">
-                <a14:hiddenLine xmlns="" xmlns:a14="http://schemas.microsoft.com/office/drawing/2010/main" w="9525">
+                <a14:hiddenLine xmlns:a14="http://schemas.microsoft.com/office/drawing/2010/main" xmlns="" w="9525">
                   <a:solidFill>
                     <a:srgbClr val="000000"/>
                   </a:solidFill>
@@ -2520,7 +2520,7 @@
             </a:ln>
             <a:extLst>
               <a:ext uri="{91240B29-F687-4f45-9708-019B960494DF}">
-                <a14:hiddenLine xmlns="" xmlns:a14="http://schemas.microsoft.com/office/drawing/2010/main" w="9525">
+                <a14:hiddenLine xmlns:a14="http://schemas.microsoft.com/office/drawing/2010/main" xmlns="" w="9525">
                   <a:solidFill>
                     <a:srgbClr val="000000"/>
                   </a:solidFill>
@@ -2582,7 +2582,7 @@
             </a:ln>
             <a:extLst>
               <a:ext uri="{91240B29-F687-4f45-9708-019B960494DF}">
-                <a14:hiddenLine xmlns="" xmlns:a14="http://schemas.microsoft.com/office/drawing/2010/main" w="9525">
+                <a14:hiddenLine xmlns:a14="http://schemas.microsoft.com/office/drawing/2010/main" xmlns="" w="9525">
                   <a:solidFill>
                     <a:srgbClr val="000000"/>
                   </a:solidFill>
@@ -2672,7 +2672,7 @@
             </a:ln>
             <a:extLst>
               <a:ext uri="{91240B29-F687-4f45-9708-019B960494DF}">
-                <a14:hiddenLine xmlns="" xmlns:a14="http://schemas.microsoft.com/office/drawing/2010/main" w="9525">
+                <a14:hiddenLine xmlns:a14="http://schemas.microsoft.com/office/drawing/2010/main" xmlns="" w="9525">
                   <a:solidFill>
                     <a:srgbClr val="000000"/>
                   </a:solidFill>
@@ -2740,7 +2740,7 @@
             </a:ln>
             <a:extLst>
               <a:ext uri="{91240B29-F687-4f45-9708-019B960494DF}">
-                <a14:hiddenLine xmlns="" xmlns:a14="http://schemas.microsoft.com/office/drawing/2010/main" w="9525">
+                <a14:hiddenLine xmlns:a14="http://schemas.microsoft.com/office/drawing/2010/main" xmlns="" w="9525">
                   <a:solidFill>
                     <a:srgbClr val="000000"/>
                   </a:solidFill>
@@ -2802,7 +2802,7 @@
             </a:ln>
             <a:extLst>
               <a:ext uri="{91240B29-F687-4f45-9708-019B960494DF}">
-                <a14:hiddenLine xmlns="" xmlns:a14="http://schemas.microsoft.com/office/drawing/2010/main" w="9525">
+                <a14:hiddenLine xmlns:a14="http://schemas.microsoft.com/office/drawing/2010/main" xmlns="" w="9525">
                   <a:solidFill>
                     <a:srgbClr val="000000"/>
                   </a:solidFill>
@@ -2892,7 +2892,7 @@
             </a:ln>
             <a:extLst>
               <a:ext uri="{91240B29-F687-4f45-9708-019B960494DF}">
-                <a14:hiddenLine xmlns="" xmlns:a14="http://schemas.microsoft.com/office/drawing/2010/main" w="9525">
+                <a14:hiddenLine xmlns:a14="http://schemas.microsoft.com/office/drawing/2010/main" xmlns="" w="9525">
                   <a:solidFill>
                     <a:srgbClr val="000000"/>
                   </a:solidFill>
@@ -2954,7 +2954,7 @@
             </a:ln>
             <a:extLst>
               <a:ext uri="{91240B29-F687-4f45-9708-019B960494DF}">
-                <a14:hiddenLine xmlns="" xmlns:a14="http://schemas.microsoft.com/office/drawing/2010/main" w="9525">
+                <a14:hiddenLine xmlns:a14="http://schemas.microsoft.com/office/drawing/2010/main" xmlns="" w="9525">
                   <a:solidFill>
                     <a:srgbClr val="000000"/>
                   </a:solidFill>
@@ -3044,7 +3044,7 @@
             </a:ln>
             <a:extLst>
               <a:ext uri="{91240B29-F687-4f45-9708-019B960494DF}">
-                <a14:hiddenLine xmlns="" xmlns:a14="http://schemas.microsoft.com/office/drawing/2010/main" w="9525">
+                <a14:hiddenLine xmlns:a14="http://schemas.microsoft.com/office/drawing/2010/main" xmlns="" w="9525">
                   <a:solidFill>
                     <a:srgbClr val="000000"/>
                   </a:solidFill>
@@ -3106,7 +3106,7 @@
             </a:ln>
             <a:extLst>
               <a:ext uri="{91240B29-F687-4f45-9708-019B960494DF}">
-                <a14:hiddenLine xmlns="" xmlns:a14="http://schemas.microsoft.com/office/drawing/2010/main" w="9525">
+                <a14:hiddenLine xmlns:a14="http://schemas.microsoft.com/office/drawing/2010/main" xmlns="" w="9525">
                   <a:solidFill>
                     <a:srgbClr val="000000"/>
                   </a:solidFill>
@@ -3196,7 +3196,7 @@
             </a:ln>
             <a:extLst>
               <a:ext uri="{91240B29-F687-4f45-9708-019B960494DF}">
-                <a14:hiddenLine xmlns="" xmlns:a14="http://schemas.microsoft.com/office/drawing/2010/main" w="9525">
+                <a14:hiddenLine xmlns:a14="http://schemas.microsoft.com/office/drawing/2010/main" xmlns="" w="9525">
                   <a:solidFill>
                     <a:srgbClr val="000000"/>
                   </a:solidFill>
@@ -3230,7 +3230,7 @@
             </a:ln>
             <a:extLst>
               <a:ext uri="{91240B29-F687-4f45-9708-019B960494DF}">
-                <a14:hiddenLine xmlns="" xmlns:a14="http://schemas.microsoft.com/office/drawing/2010/main" w="9525">
+                <a14:hiddenLine xmlns:a14="http://schemas.microsoft.com/office/drawing/2010/main" xmlns="" w="9525">
                   <a:solidFill>
                     <a:srgbClr val="000000"/>
                   </a:solidFill>
@@ -3295,7 +3295,7 @@
             </a:ln>
             <a:extLst>
               <a:ext uri="{91240B29-F687-4f45-9708-019B960494DF}">
-                <a14:hiddenLine xmlns="" xmlns:a14="http://schemas.microsoft.com/office/drawing/2010/main" w="9525">
+                <a14:hiddenLine xmlns:a14="http://schemas.microsoft.com/office/drawing/2010/main" xmlns="" w="9525">
                   <a:solidFill>
                     <a:srgbClr val="000000"/>
                   </a:solidFill>
@@ -3385,7 +3385,7 @@
             </a:ln>
             <a:extLst>
               <a:ext uri="{91240B29-F687-4f45-9708-019B960494DF}">
-                <a14:hiddenLine xmlns="" xmlns:a14="http://schemas.microsoft.com/office/drawing/2010/main" w="9525">
+                <a14:hiddenLine xmlns:a14="http://schemas.microsoft.com/office/drawing/2010/main" xmlns="" w="9525">
                   <a:solidFill>
                     <a:srgbClr val="000000"/>
                   </a:solidFill>
@@ -3447,7 +3447,7 @@
             </a:ln>
             <a:extLst>
               <a:ext uri="{91240B29-F687-4f45-9708-019B960494DF}">
-                <a14:hiddenLine xmlns="" xmlns:a14="http://schemas.microsoft.com/office/drawing/2010/main" w="9525">
+                <a14:hiddenLine xmlns:a14="http://schemas.microsoft.com/office/drawing/2010/main" xmlns="" w="9525">
                   <a:solidFill>
                     <a:srgbClr val="000000"/>
                   </a:solidFill>
@@ -3537,7 +3537,7 @@
             </a:ln>
             <a:extLst>
               <a:ext uri="{91240B29-F687-4f45-9708-019B960494DF}">
-                <a14:hiddenLine xmlns="" xmlns:a14="http://schemas.microsoft.com/office/drawing/2010/main" w="9525">
+                <a14:hiddenLine xmlns:a14="http://schemas.microsoft.com/office/drawing/2010/main" xmlns="" w="9525">
                   <a:solidFill>
                     <a:srgbClr val="000000"/>
                   </a:solidFill>
@@ -3627,7 +3627,7 @@
             </a:ln>
             <a:extLst>
               <a:ext uri="{91240B29-F687-4f45-9708-019B960494DF}">
-                <a14:hiddenLine xmlns="" xmlns:a14="http://schemas.microsoft.com/office/drawing/2010/main" w="9525">
+                <a14:hiddenLine xmlns:a14="http://schemas.microsoft.com/office/drawing/2010/main" xmlns="" w="9525">
                   <a:solidFill>
                     <a:srgbClr val="000000"/>
                   </a:solidFill>
@@ -3692,7 +3692,7 @@
             </a:ln>
             <a:extLst>
               <a:ext uri="{91240B29-F687-4f45-9708-019B960494DF}">
-                <a14:hiddenLine xmlns="" xmlns:a14="http://schemas.microsoft.com/office/drawing/2010/main" w="9525">
+                <a14:hiddenLine xmlns:a14="http://schemas.microsoft.com/office/drawing/2010/main" xmlns="" w="9525">
                   <a:solidFill>
                     <a:srgbClr val="000000"/>
                   </a:solidFill>
@@ -3754,7 +3754,7 @@
             </a:ln>
             <a:extLst>
               <a:ext uri="{91240B29-F687-4f45-9708-019B960494DF}">
-                <a14:hiddenLine xmlns="" xmlns:a14="http://schemas.microsoft.com/office/drawing/2010/main" w="9525">
+                <a14:hiddenLine xmlns:a14="http://schemas.microsoft.com/office/drawing/2010/main" xmlns="" w="9525">
                   <a:solidFill>
                     <a:srgbClr val="000000"/>
                   </a:solidFill>
@@ -3844,7 +3844,7 @@
             </a:ln>
             <a:extLst>
               <a:ext uri="{91240B29-F687-4f45-9708-019B960494DF}">
-                <a14:hiddenLine xmlns="" xmlns:a14="http://schemas.microsoft.com/office/drawing/2010/main" w="9525">
+                <a14:hiddenLine xmlns:a14="http://schemas.microsoft.com/office/drawing/2010/main" xmlns="" w="9525">
                   <a:solidFill>
                     <a:srgbClr val="000000"/>
                   </a:solidFill>
@@ -3934,7 +3934,7 @@
             </a:ln>
             <a:extLst>
               <a:ext uri="{91240B29-F687-4f45-9708-019B960494DF}">
-                <a14:hiddenLine xmlns="" xmlns:a14="http://schemas.microsoft.com/office/drawing/2010/main" w="9525">
+                <a14:hiddenLine xmlns:a14="http://schemas.microsoft.com/office/drawing/2010/main" xmlns="" w="9525">
                   <a:solidFill>
                     <a:srgbClr val="000000"/>
                   </a:solidFill>
@@ -3996,7 +3996,7 @@
             </a:ln>
             <a:extLst>
               <a:ext uri="{91240B29-F687-4f45-9708-019B960494DF}">
-                <a14:hiddenLine xmlns="" xmlns:a14="http://schemas.microsoft.com/office/drawing/2010/main" w="9525">
+                <a14:hiddenLine xmlns:a14="http://schemas.microsoft.com/office/drawing/2010/main" xmlns="" w="9525">
                   <a:solidFill>
                     <a:srgbClr val="000000"/>
                   </a:solidFill>
@@ -4116,7 +4116,7 @@
             </a:ln>
             <a:extLst>
               <a:ext uri="{91240B29-F687-4f45-9708-019B960494DF}">
-                <a14:hiddenLine xmlns="" xmlns:a14="http://schemas.microsoft.com/office/drawing/2010/main" w="9525">
+                <a14:hiddenLine xmlns:a14="http://schemas.microsoft.com/office/drawing/2010/main" xmlns="" w="9525">
                   <a:solidFill>
                     <a:srgbClr val="000000"/>
                   </a:solidFill>
@@ -4184,7 +4184,7 @@
             </a:ln>
             <a:extLst>
               <a:ext uri="{91240B29-F687-4f45-9708-019B960494DF}">
-                <a14:hiddenLine xmlns="" xmlns:a14="http://schemas.microsoft.com/office/drawing/2010/main" w="9525">
+                <a14:hiddenLine xmlns:a14="http://schemas.microsoft.com/office/drawing/2010/main" xmlns="" w="9525">
                   <a:solidFill>
                     <a:srgbClr val="000000"/>
                   </a:solidFill>
@@ -4274,7 +4274,7 @@
             </a:ln>
             <a:extLst>
               <a:ext uri="{91240B29-F687-4f45-9708-019B960494DF}">
-                <a14:hiddenLine xmlns="" xmlns:a14="http://schemas.microsoft.com/office/drawing/2010/main" w="9525">
+                <a14:hiddenLine xmlns:a14="http://schemas.microsoft.com/office/drawing/2010/main" xmlns="" w="9525">
                   <a:solidFill>
                     <a:srgbClr val="000000"/>
                   </a:solidFill>
@@ -4414,7 +4414,7 @@
           <a:p>
             <a:fld id="{8DCB84B0-2216-46A3-91E2-6A737E8ACCEC}" type="datetimeFigureOut">
               <a:rPr lang="pt-PT" smtClean="0"/>
-              <a:t>30-05-2016</a:t>
+              <a:t>31/05/2016</a:t>
             </a:fld>
             <a:endParaRPr lang="pt-PT"/>
           </a:p>
@@ -4684,7 +4684,7 @@
           <a:p>
             <a:fld id="{8DCB84B0-2216-46A3-91E2-6A737E8ACCEC}" type="datetimeFigureOut">
               <a:rPr lang="pt-PT" smtClean="0"/>
-              <a:t>30-05-2016</a:t>
+              <a:t>31/05/2016</a:t>
             </a:fld>
             <a:endParaRPr lang="pt-PT"/>
           </a:p>
@@ -4883,7 +4883,7 @@
           <a:p>
             <a:fld id="{8DCB84B0-2216-46A3-91E2-6A737E8ACCEC}" type="datetimeFigureOut">
               <a:rPr lang="pt-PT" smtClean="0"/>
-              <a:t>30-05-2016</a:t>
+              <a:t>31/05/2016</a:t>
             </a:fld>
             <a:endParaRPr lang="pt-PT"/>
           </a:p>
@@ -5149,7 +5149,7 @@
           <a:p>
             <a:fld id="{8DCB84B0-2216-46A3-91E2-6A737E8ACCEC}" type="datetimeFigureOut">
               <a:rPr lang="pt-PT" smtClean="0"/>
-              <a:t>30-05-2016</a:t>
+              <a:t>31/05/2016</a:t>
             </a:fld>
             <a:endParaRPr lang="pt-PT"/>
           </a:p>
@@ -5586,7 +5586,7 @@
           <a:p>
             <a:fld id="{8DCB84B0-2216-46A3-91E2-6A737E8ACCEC}" type="datetimeFigureOut">
               <a:rPr lang="pt-PT" smtClean="0"/>
-              <a:t>30-05-2016</a:t>
+              <a:t>31/05/2016</a:t>
             </a:fld>
             <a:endParaRPr lang="pt-PT"/>
           </a:p>
@@ -6135,7 +6135,7 @@
           <a:p>
             <a:fld id="{8DCB84B0-2216-46A3-91E2-6A737E8ACCEC}" type="datetimeFigureOut">
               <a:rPr lang="pt-PT" smtClean="0"/>
-              <a:t>30-05-2016</a:t>
+              <a:t>31/05/2016</a:t>
             </a:fld>
             <a:endParaRPr lang="pt-PT"/>
           </a:p>
@@ -6858,7 +6858,7 @@
           <a:p>
             <a:fld id="{8DCB84B0-2216-46A3-91E2-6A737E8ACCEC}" type="datetimeFigureOut">
               <a:rPr lang="pt-PT" smtClean="0"/>
-              <a:t>30-05-2016</a:t>
+              <a:t>31/05/2016</a:t>
             </a:fld>
             <a:endParaRPr lang="pt-PT"/>
           </a:p>
@@ -7031,7 +7031,7 @@
           <a:p>
             <a:fld id="{8DCB84B0-2216-46A3-91E2-6A737E8ACCEC}" type="datetimeFigureOut">
               <a:rPr lang="pt-PT" smtClean="0"/>
-              <a:t>30-05-2016</a:t>
+              <a:t>31/05/2016</a:t>
             </a:fld>
             <a:endParaRPr lang="pt-PT"/>
           </a:p>
@@ -7214,7 +7214,7 @@
           <a:p>
             <a:fld id="{8DCB84B0-2216-46A3-91E2-6A737E8ACCEC}" type="datetimeFigureOut">
               <a:rPr lang="pt-PT" smtClean="0"/>
-              <a:t>30-05-2016</a:t>
+              <a:t>31/05/2016</a:t>
             </a:fld>
             <a:endParaRPr lang="pt-PT"/>
           </a:p>
@@ -7387,7 +7387,7 @@
           <a:p>
             <a:fld id="{8DCB84B0-2216-46A3-91E2-6A737E8ACCEC}" type="datetimeFigureOut">
               <a:rPr lang="pt-PT" smtClean="0"/>
-              <a:t>30-05-2016</a:t>
+              <a:t>31/05/2016</a:t>
             </a:fld>
             <a:endParaRPr lang="pt-PT"/>
           </a:p>
@@ -7640,7 +7640,7 @@
           <a:p>
             <a:fld id="{8DCB84B0-2216-46A3-91E2-6A737E8ACCEC}" type="datetimeFigureOut">
               <a:rPr lang="pt-PT" smtClean="0"/>
-              <a:t>30-05-2016</a:t>
+              <a:t>31/05/2016</a:t>
             </a:fld>
             <a:endParaRPr lang="pt-PT"/>
           </a:p>
@@ -7875,7 +7875,7 @@
           <a:p>
             <a:fld id="{8DCB84B0-2216-46A3-91E2-6A737E8ACCEC}" type="datetimeFigureOut">
               <a:rPr lang="pt-PT" smtClean="0"/>
-              <a:t>30-05-2016</a:t>
+              <a:t>31/05/2016</a:t>
             </a:fld>
             <a:endParaRPr lang="pt-PT"/>
           </a:p>
@@ -8259,7 +8259,7 @@
           <a:p>
             <a:fld id="{8DCB84B0-2216-46A3-91E2-6A737E8ACCEC}" type="datetimeFigureOut">
               <a:rPr lang="pt-PT" smtClean="0"/>
-              <a:t>30-05-2016</a:t>
+              <a:t>31/05/2016</a:t>
             </a:fld>
             <a:endParaRPr lang="pt-PT"/>
           </a:p>
@@ -8380,7 +8380,7 @@
           <a:p>
             <a:fld id="{8DCB84B0-2216-46A3-91E2-6A737E8ACCEC}" type="datetimeFigureOut">
               <a:rPr lang="pt-PT" smtClean="0"/>
-              <a:t>30-05-2016</a:t>
+              <a:t>31/05/2016</a:t>
             </a:fld>
             <a:endParaRPr lang="pt-PT"/>
           </a:p>
@@ -8478,7 +8478,7 @@
           <a:p>
             <a:fld id="{8DCB84B0-2216-46A3-91E2-6A737E8ACCEC}" type="datetimeFigureOut">
               <a:rPr lang="pt-PT" smtClean="0"/>
-              <a:t>30-05-2016</a:t>
+              <a:t>31/05/2016</a:t>
             </a:fld>
             <a:endParaRPr lang="pt-PT"/>
           </a:p>
@@ -8730,7 +8730,7 @@
           <a:p>
             <a:fld id="{8DCB84B0-2216-46A3-91E2-6A737E8ACCEC}" type="datetimeFigureOut">
               <a:rPr lang="pt-PT" smtClean="0"/>
-              <a:t>30-05-2016</a:t>
+              <a:t>31/05/2016</a:t>
             </a:fld>
             <a:endParaRPr lang="pt-PT"/>
           </a:p>
@@ -9013,7 +9013,7 @@
           <a:p>
             <a:fld id="{8DCB84B0-2216-46A3-91E2-6A737E8ACCEC}" type="datetimeFigureOut">
               <a:rPr lang="pt-PT" smtClean="0"/>
-              <a:t>30-05-2016</a:t>
+              <a:t>31/05/2016</a:t>
             </a:fld>
             <a:endParaRPr lang="pt-PT"/>
           </a:p>
@@ -9169,7 +9169,7 @@
           <a:noFill/>
           <a:extLst>
             <a:ext uri="{909E8E84-426E-40dd-AFC4-6F175D3DCCD1}">
-              <a14:hiddenFill xmlns="" xmlns:a14="http://schemas.microsoft.com/office/drawing/2010/main">
+              <a14:hiddenFill xmlns:a14="http://schemas.microsoft.com/office/drawing/2010/main" xmlns="">
                 <a:solidFill>
                   <a:srgbClr val="FFFFFF"/>
                 </a:solidFill>
@@ -9243,7 +9243,7 @@
               </a:ln>
               <a:extLst>
                 <a:ext uri="{91240B29-F687-4f45-9708-019B960494DF}">
-                  <a14:hiddenLine xmlns="" xmlns:a14="http://schemas.microsoft.com/office/drawing/2010/main" w="9525">
+                  <a14:hiddenLine xmlns:a14="http://schemas.microsoft.com/office/drawing/2010/main" xmlns="" w="9525">
                     <a:solidFill>
                       <a:srgbClr val="000000"/>
                     </a:solidFill>
@@ -9333,7 +9333,7 @@
               </a:ln>
               <a:extLst>
                 <a:ext uri="{91240B29-F687-4f45-9708-019B960494DF}">
-                  <a14:hiddenLine xmlns="" xmlns:a14="http://schemas.microsoft.com/office/drawing/2010/main" w="9525">
+                  <a14:hiddenLine xmlns:a14="http://schemas.microsoft.com/office/drawing/2010/main" xmlns="" w="9525">
                     <a:solidFill>
                       <a:srgbClr val="000000"/>
                     </a:solidFill>
@@ -9423,7 +9423,7 @@
               </a:ln>
               <a:extLst>
                 <a:ext uri="{91240B29-F687-4f45-9708-019B960494DF}">
-                  <a14:hiddenLine xmlns="" xmlns:a14="http://schemas.microsoft.com/office/drawing/2010/main" w="9525">
+                  <a14:hiddenLine xmlns:a14="http://schemas.microsoft.com/office/drawing/2010/main" xmlns="" w="9525">
                     <a:solidFill>
                       <a:srgbClr val="000000"/>
                     </a:solidFill>
@@ -9485,7 +9485,7 @@
               </a:ln>
               <a:extLst>
                 <a:ext uri="{91240B29-F687-4f45-9708-019B960494DF}">
-                  <a14:hiddenLine xmlns="" xmlns:a14="http://schemas.microsoft.com/office/drawing/2010/main" w="9525">
+                  <a14:hiddenLine xmlns:a14="http://schemas.microsoft.com/office/drawing/2010/main" xmlns="" w="9525">
                     <a:solidFill>
                       <a:srgbClr val="000000"/>
                     </a:solidFill>
@@ -9575,7 +9575,7 @@
               </a:ln>
               <a:extLst>
                 <a:ext uri="{91240B29-F687-4f45-9708-019B960494DF}">
-                  <a14:hiddenLine xmlns="" xmlns:a14="http://schemas.microsoft.com/office/drawing/2010/main" w="9525">
+                  <a14:hiddenLine xmlns:a14="http://schemas.microsoft.com/office/drawing/2010/main" xmlns="" w="9525">
                     <a:solidFill>
                       <a:srgbClr val="000000"/>
                     </a:solidFill>
@@ -9637,7 +9637,7 @@
               </a:ln>
               <a:extLst>
                 <a:ext uri="{91240B29-F687-4f45-9708-019B960494DF}">
-                  <a14:hiddenLine xmlns="" xmlns:a14="http://schemas.microsoft.com/office/drawing/2010/main" w="9525">
+                  <a14:hiddenLine xmlns:a14="http://schemas.microsoft.com/office/drawing/2010/main" xmlns="" w="9525">
                     <a:solidFill>
                       <a:srgbClr val="000000"/>
                     </a:solidFill>
@@ -9699,7 +9699,7 @@
               </a:ln>
               <a:extLst>
                 <a:ext uri="{91240B29-F687-4f45-9708-019B960494DF}">
-                  <a14:hiddenLine xmlns="" xmlns:a14="http://schemas.microsoft.com/office/drawing/2010/main" w="9525">
+                  <a14:hiddenLine xmlns:a14="http://schemas.microsoft.com/office/drawing/2010/main" xmlns="" w="9525">
                     <a:solidFill>
                       <a:srgbClr val="000000"/>
                     </a:solidFill>
@@ -9789,7 +9789,7 @@
               </a:ln>
               <a:extLst>
                 <a:ext uri="{91240B29-F687-4f45-9708-019B960494DF}">
-                  <a14:hiddenLine xmlns="" xmlns:a14="http://schemas.microsoft.com/office/drawing/2010/main" w="9525">
+                  <a14:hiddenLine xmlns:a14="http://schemas.microsoft.com/office/drawing/2010/main" xmlns="" w="9525">
                     <a:solidFill>
                       <a:srgbClr val="000000"/>
                     </a:solidFill>
@@ -9879,7 +9879,7 @@
               </a:ln>
               <a:extLst>
                 <a:ext uri="{91240B29-F687-4f45-9708-019B960494DF}">
-                  <a14:hiddenLine xmlns="" xmlns:a14="http://schemas.microsoft.com/office/drawing/2010/main" w="9525">
+                  <a14:hiddenLine xmlns:a14="http://schemas.microsoft.com/office/drawing/2010/main" xmlns="" w="9525">
                     <a:solidFill>
                       <a:srgbClr val="000000"/>
                     </a:solidFill>
@@ -9941,7 +9941,7 @@
               </a:ln>
               <a:extLst>
                 <a:ext uri="{91240B29-F687-4f45-9708-019B960494DF}">
-                  <a14:hiddenLine xmlns="" xmlns:a14="http://schemas.microsoft.com/office/drawing/2010/main" w="9525">
+                  <a14:hiddenLine xmlns:a14="http://schemas.microsoft.com/office/drawing/2010/main" xmlns="" w="9525">
                     <a:solidFill>
                       <a:srgbClr val="000000"/>
                     </a:solidFill>
@@ -10051,7 +10051,7 @@
               </a:ln>
               <a:extLst>
                 <a:ext uri="{91240B29-F687-4f45-9708-019B960494DF}">
-                  <a14:hiddenLine xmlns="" xmlns:a14="http://schemas.microsoft.com/office/drawing/2010/main" w="9525">
+                  <a14:hiddenLine xmlns:a14="http://schemas.microsoft.com/office/drawing/2010/main" xmlns="" w="9525">
                     <a:solidFill>
                       <a:srgbClr val="000000"/>
                     </a:solidFill>
@@ -10135,7 +10135,7 @@
               </a:ln>
               <a:extLst>
                 <a:ext uri="{91240B29-F687-4f45-9708-019B960494DF}">
-                  <a14:hiddenLine xmlns="" xmlns:a14="http://schemas.microsoft.com/office/drawing/2010/main" w="9525">
+                  <a14:hiddenLine xmlns:a14="http://schemas.microsoft.com/office/drawing/2010/main" xmlns="" w="9525">
                     <a:solidFill>
                       <a:srgbClr val="000000"/>
                     </a:solidFill>
@@ -10197,7 +10197,7 @@
               </a:ln>
               <a:extLst>
                 <a:ext uri="{91240B29-F687-4f45-9708-019B960494DF}">
-                  <a14:hiddenLine xmlns="" xmlns:a14="http://schemas.microsoft.com/office/drawing/2010/main" w="9525">
+                  <a14:hiddenLine xmlns:a14="http://schemas.microsoft.com/office/drawing/2010/main" xmlns="" w="9525">
                     <a:solidFill>
                       <a:srgbClr val="000000"/>
                     </a:solidFill>
@@ -10259,7 +10259,7 @@
               </a:ln>
               <a:extLst>
                 <a:ext uri="{91240B29-F687-4f45-9708-019B960494DF}">
-                  <a14:hiddenLine xmlns="" xmlns:a14="http://schemas.microsoft.com/office/drawing/2010/main" w="9525">
+                  <a14:hiddenLine xmlns:a14="http://schemas.microsoft.com/office/drawing/2010/main" xmlns="" w="9525">
                     <a:solidFill>
                       <a:srgbClr val="000000"/>
                     </a:solidFill>
@@ -10349,7 +10349,7 @@
               </a:ln>
               <a:extLst>
                 <a:ext uri="{91240B29-F687-4f45-9708-019B960494DF}">
-                  <a14:hiddenLine xmlns="" xmlns:a14="http://schemas.microsoft.com/office/drawing/2010/main" w="9525">
+                  <a14:hiddenLine xmlns:a14="http://schemas.microsoft.com/office/drawing/2010/main" xmlns="" w="9525">
                     <a:solidFill>
                       <a:srgbClr val="000000"/>
                     </a:solidFill>
@@ -10383,7 +10383,7 @@
               </a:ln>
               <a:extLst>
                 <a:ext uri="{91240B29-F687-4f45-9708-019B960494DF}">
-                  <a14:hiddenLine xmlns="" xmlns:a14="http://schemas.microsoft.com/office/drawing/2010/main" w="9525">
+                  <a14:hiddenLine xmlns:a14="http://schemas.microsoft.com/office/drawing/2010/main" xmlns="" w="9525">
                     <a:solidFill>
                       <a:srgbClr val="000000"/>
                     </a:solidFill>
@@ -10448,7 +10448,7 @@
               </a:ln>
               <a:extLst>
                 <a:ext uri="{91240B29-F687-4f45-9708-019B960494DF}">
-                  <a14:hiddenLine xmlns="" xmlns:a14="http://schemas.microsoft.com/office/drawing/2010/main" w="9525">
+                  <a14:hiddenLine xmlns:a14="http://schemas.microsoft.com/office/drawing/2010/main" xmlns="" w="9525">
                     <a:solidFill>
                       <a:srgbClr val="000000"/>
                     </a:solidFill>
@@ -10538,7 +10538,7 @@
               </a:ln>
               <a:extLst>
                 <a:ext uri="{91240B29-F687-4f45-9708-019B960494DF}">
-                  <a14:hiddenLine xmlns="" xmlns:a14="http://schemas.microsoft.com/office/drawing/2010/main" w="9525">
+                  <a14:hiddenLine xmlns:a14="http://schemas.microsoft.com/office/drawing/2010/main" xmlns="" w="9525">
                     <a:solidFill>
                       <a:srgbClr val="000000"/>
                     </a:solidFill>
@@ -10600,7 +10600,7 @@
               </a:ln>
               <a:extLst>
                 <a:ext uri="{91240B29-F687-4f45-9708-019B960494DF}">
-                  <a14:hiddenLine xmlns="" xmlns:a14="http://schemas.microsoft.com/office/drawing/2010/main" w="9525">
+                  <a14:hiddenLine xmlns:a14="http://schemas.microsoft.com/office/drawing/2010/main" xmlns="" w="9525">
                     <a:solidFill>
                       <a:srgbClr val="000000"/>
                     </a:solidFill>
@@ -10690,7 +10690,7 @@
               </a:ln>
               <a:extLst>
                 <a:ext uri="{91240B29-F687-4f45-9708-019B960494DF}">
-                  <a14:hiddenLine xmlns="" xmlns:a14="http://schemas.microsoft.com/office/drawing/2010/main" w="9525">
+                  <a14:hiddenLine xmlns:a14="http://schemas.microsoft.com/office/drawing/2010/main" xmlns="" w="9525">
                     <a:solidFill>
                       <a:srgbClr val="000000"/>
                     </a:solidFill>
@@ -10755,7 +10755,7 @@
               </a:ln>
               <a:extLst>
                 <a:ext uri="{91240B29-F687-4f45-9708-019B960494DF}">
-                  <a14:hiddenLine xmlns="" xmlns:a14="http://schemas.microsoft.com/office/drawing/2010/main" w="9525">
+                  <a14:hiddenLine xmlns:a14="http://schemas.microsoft.com/office/drawing/2010/main" xmlns="" w="9525">
                     <a:solidFill>
                       <a:srgbClr val="000000"/>
                     </a:solidFill>
@@ -10817,7 +10817,7 @@
               </a:ln>
               <a:extLst>
                 <a:ext uri="{91240B29-F687-4f45-9708-019B960494DF}">
-                  <a14:hiddenLine xmlns="" xmlns:a14="http://schemas.microsoft.com/office/drawing/2010/main" w="9525">
+                  <a14:hiddenLine xmlns:a14="http://schemas.microsoft.com/office/drawing/2010/main" xmlns="" w="9525">
                     <a:solidFill>
                       <a:srgbClr val="000000"/>
                     </a:solidFill>
@@ -10907,7 +10907,7 @@
               </a:ln>
               <a:extLst>
                 <a:ext uri="{91240B29-F687-4f45-9708-019B960494DF}">
-                  <a14:hiddenLine xmlns="" xmlns:a14="http://schemas.microsoft.com/office/drawing/2010/main" w="9525">
+                  <a14:hiddenLine xmlns:a14="http://schemas.microsoft.com/office/drawing/2010/main" xmlns="" w="9525">
                     <a:solidFill>
                       <a:srgbClr val="000000"/>
                     </a:solidFill>
@@ -10997,7 +10997,7 @@
               </a:ln>
               <a:extLst>
                 <a:ext uri="{91240B29-F687-4f45-9708-019B960494DF}">
-                  <a14:hiddenLine xmlns="" xmlns:a14="http://schemas.microsoft.com/office/drawing/2010/main" w="9525">
+                  <a14:hiddenLine xmlns:a14="http://schemas.microsoft.com/office/drawing/2010/main" xmlns="" w="9525">
                     <a:solidFill>
                       <a:srgbClr val="000000"/>
                     </a:solidFill>
@@ -11062,7 +11062,7 @@
               </a:ln>
               <a:extLst>
                 <a:ext uri="{91240B29-F687-4f45-9708-019B960494DF}">
-                  <a14:hiddenLine xmlns="" xmlns:a14="http://schemas.microsoft.com/office/drawing/2010/main" w="9525">
+                  <a14:hiddenLine xmlns:a14="http://schemas.microsoft.com/office/drawing/2010/main" xmlns="" w="9525">
                     <a:solidFill>
                       <a:srgbClr val="000000"/>
                     </a:solidFill>
@@ -11182,7 +11182,7 @@
               </a:ln>
               <a:extLst>
                 <a:ext uri="{91240B29-F687-4f45-9708-019B960494DF}">
-                  <a14:hiddenLine xmlns="" xmlns:a14="http://schemas.microsoft.com/office/drawing/2010/main" w="9525">
+                  <a14:hiddenLine xmlns:a14="http://schemas.microsoft.com/office/drawing/2010/main" xmlns="" w="9525">
                     <a:solidFill>
                       <a:srgbClr val="000000"/>
                     </a:solidFill>
@@ -11263,7 +11263,7 @@
               </a:ln>
               <a:extLst>
                 <a:ext uri="{91240B29-F687-4f45-9708-019B960494DF}">
-                  <a14:hiddenLine xmlns="" xmlns:a14="http://schemas.microsoft.com/office/drawing/2010/main" w="9525">
+                  <a14:hiddenLine xmlns:a14="http://schemas.microsoft.com/office/drawing/2010/main" xmlns="" w="9525">
                     <a:solidFill>
                       <a:srgbClr val="000000"/>
                     </a:solidFill>
@@ -11378,7 +11378,7 @@
               </a:ln>
               <a:extLst>
                 <a:ext uri="{91240B29-F687-4f45-9708-019B960494DF}">
-                  <a14:hiddenLine xmlns="" xmlns:a14="http://schemas.microsoft.com/office/drawing/2010/main" w="9525">
+                  <a14:hiddenLine xmlns:a14="http://schemas.microsoft.com/office/drawing/2010/main" xmlns="" w="9525">
                     <a:solidFill>
                       <a:srgbClr val="000000"/>
                     </a:solidFill>
@@ -11468,7 +11468,7 @@
               </a:ln>
               <a:extLst>
                 <a:ext uri="{91240B29-F687-4f45-9708-019B960494DF}">
-                  <a14:hiddenLine xmlns="" xmlns:a14="http://schemas.microsoft.com/office/drawing/2010/main" w="9525">
+                  <a14:hiddenLine xmlns:a14="http://schemas.microsoft.com/office/drawing/2010/main" xmlns="" w="9525">
                     <a:solidFill>
                       <a:srgbClr val="000000"/>
                     </a:solidFill>
@@ -11533,7 +11533,7 @@
               </a:ln>
               <a:extLst>
                 <a:ext uri="{91240B29-F687-4f45-9708-019B960494DF}">
-                  <a14:hiddenLine xmlns="" xmlns:a14="http://schemas.microsoft.com/office/drawing/2010/main" w="9525">
+                  <a14:hiddenLine xmlns:a14="http://schemas.microsoft.com/office/drawing/2010/main" xmlns="" w="9525">
                     <a:solidFill>
                       <a:srgbClr val="000000"/>
                     </a:solidFill>
@@ -11623,7 +11623,7 @@
               </a:ln>
               <a:extLst>
                 <a:ext uri="{91240B29-F687-4f45-9708-019B960494DF}">
-                  <a14:hiddenLine xmlns="" xmlns:a14="http://schemas.microsoft.com/office/drawing/2010/main" w="9525">
+                  <a14:hiddenLine xmlns:a14="http://schemas.microsoft.com/office/drawing/2010/main" xmlns="" w="9525">
                     <a:solidFill>
                       <a:srgbClr val="000000"/>
                     </a:solidFill>
@@ -11691,7 +11691,7 @@
               </a:ln>
               <a:extLst>
                 <a:ext uri="{91240B29-F687-4f45-9708-019B960494DF}">
-                  <a14:hiddenLine xmlns="" xmlns:a14="http://schemas.microsoft.com/office/drawing/2010/main" w="9525">
+                  <a14:hiddenLine xmlns:a14="http://schemas.microsoft.com/office/drawing/2010/main" xmlns="" w="9525">
                     <a:solidFill>
                       <a:srgbClr val="000000"/>
                     </a:solidFill>
@@ -11781,7 +11781,7 @@
               </a:ln>
               <a:extLst>
                 <a:ext uri="{91240B29-F687-4f45-9708-019B960494DF}">
-                  <a14:hiddenLine xmlns="" xmlns:a14="http://schemas.microsoft.com/office/drawing/2010/main" w="9525">
+                  <a14:hiddenLine xmlns:a14="http://schemas.microsoft.com/office/drawing/2010/main" xmlns="" w="9525">
                     <a:solidFill>
                       <a:srgbClr val="000000"/>
                     </a:solidFill>
@@ -11849,7 +11849,7 @@
               </a:ln>
               <a:extLst>
                 <a:ext uri="{91240B29-F687-4f45-9708-019B960494DF}">
-                  <a14:hiddenLine xmlns="" xmlns:a14="http://schemas.microsoft.com/office/drawing/2010/main" w="9525">
+                  <a14:hiddenLine xmlns:a14="http://schemas.microsoft.com/office/drawing/2010/main" xmlns="" w="9525">
                     <a:solidFill>
                       <a:srgbClr val="000000"/>
                     </a:solidFill>
@@ -11939,7 +11939,7 @@
               </a:ln>
               <a:extLst>
                 <a:ext uri="{91240B29-F687-4f45-9708-019B960494DF}">
-                  <a14:hiddenLine xmlns="" xmlns:a14="http://schemas.microsoft.com/office/drawing/2010/main" w="9525">
+                  <a14:hiddenLine xmlns:a14="http://schemas.microsoft.com/office/drawing/2010/main" xmlns="" w="9525">
                     <a:solidFill>
                       <a:srgbClr val="000000"/>
                     </a:solidFill>
@@ -11973,7 +11973,7 @@
               </a:ln>
               <a:extLst>
                 <a:ext uri="{91240B29-F687-4f45-9708-019B960494DF}">
-                  <a14:hiddenLine xmlns="" xmlns:a14="http://schemas.microsoft.com/office/drawing/2010/main" w="9525">
+                  <a14:hiddenLine xmlns:a14="http://schemas.microsoft.com/office/drawing/2010/main" xmlns="" w="9525">
                     <a:solidFill>
                       <a:srgbClr val="000000"/>
                     </a:solidFill>
@@ -12113,7 +12113,7 @@
           <a:p>
             <a:fld id="{8DCB84B0-2216-46A3-91E2-6A737E8ACCEC}" type="datetimeFigureOut">
               <a:rPr lang="pt-PT" smtClean="0"/>
-              <a:t>30-05-2016</a:t>
+              <a:t>31/05/2016</a:t>
             </a:fld>
             <a:endParaRPr lang="pt-PT"/>
           </a:p>
@@ -15347,16 +15347,32 @@
           <a:lstStyle/>
           <a:p>
             <a:r>
-              <a:rPr lang="pt-PT" dirty="0" err="1"/>
-              <a:t>Section</a:t>
-            </a:r>
-            <a:r>
-              <a:rPr lang="pt-PT" dirty="0"/>
+              <a:rPr lang="pt-PT" dirty="0" err="1" smtClean="0"/>
+              <a:t>Code</a:t>
+            </a:r>
+            <a:r>
+              <a:rPr lang="pt-PT" dirty="0" smtClean="0"/>
               <a:t> </a:t>
             </a:r>
             <a:r>
+              <a:rPr lang="pt-PT" dirty="0" err="1" smtClean="0"/>
+              <a:t>Contribution</a:t>
+            </a:r>
+            <a:r>
               <a:rPr lang="pt-PT" dirty="0" smtClean="0"/>
-              <a:t>X (Regra do Miguel)</a:t>
+              <a:t>: </a:t>
+            </a:r>
+            <a:r>
+              <a:rPr lang="pt-PT" dirty="0" err="1" smtClean="0"/>
+              <a:t>Makefile</a:t>
+            </a:r>
+            <a:r>
+              <a:rPr lang="pt-PT" dirty="0" smtClean="0"/>
+              <a:t> </a:t>
+            </a:r>
+            <a:r>
+              <a:rPr lang="pt-PT" dirty="0" err="1" smtClean="0"/>
+              <a:t>RUle</a:t>
             </a:r>
             <a:endParaRPr lang="pt-PT" dirty="0"/>
           </a:p>
@@ -15364,12 +15380,12 @@
       </p:sp>
       <p:sp>
         <p:nvSpPr>
-          <p:cNvPr id="3" name="Marcador de Posição de Conteúdo 2"/>
+          <p:cNvPr id="4" name="Marcador de Posição de Conteúdo 3"/>
           <p:cNvSpPr>
             <a:spLocks noGrp="1"/>
           </p:cNvSpPr>
           <p:nvPr>
-            <p:ph idx="1"/>
+            <p:ph sz="half" idx="1"/>
           </p:nvPr>
         </p:nvSpPr>
         <p:spPr/>
@@ -15377,10 +15393,71 @@
           <a:bodyPr/>
           <a:lstStyle/>
           <a:p>
-            <a:endParaRPr lang="pt-PT"/>
+            <a:r>
+              <a:rPr lang="en-US" dirty="0" smtClean="0"/>
+              <a:t>We implemented a dynamic rule that, given malformed/invalid make file invocation:</a:t>
+            </a:r>
+          </a:p>
+          <a:p>
+            <a:pPr lvl="1"/>
+            <a:r>
+              <a:rPr lang="en-US" dirty="0" smtClean="0"/>
+              <a:t>Parses the </a:t>
+            </a:r>
+            <a:r>
+              <a:rPr lang="en-US" i="1" dirty="0" err="1" smtClean="0"/>
+              <a:t>Makefile</a:t>
+            </a:r>
+            <a:r>
+              <a:rPr lang="en-US" dirty="0" smtClean="0"/>
+              <a:t>;</a:t>
+            </a:r>
+          </a:p>
+          <a:p>
+            <a:pPr lvl="1"/>
+            <a:r>
+              <a:rPr lang="en-US" dirty="0" smtClean="0"/>
+              <a:t>Retrieves it’s targets using regular expression matching;</a:t>
+            </a:r>
+          </a:p>
+          <a:p>
+            <a:pPr lvl="1"/>
+            <a:r>
+              <a:rPr lang="en-US" dirty="0" smtClean="0"/>
+              <a:t>Returns the most similarly named valid target.</a:t>
+            </a:r>
+            <a:endParaRPr lang="en-US" dirty="0"/>
           </a:p>
         </p:txBody>
       </p:sp>
+      <p:pic>
+        <p:nvPicPr>
+          <p:cNvPr id="6" name="Marcador de Posição de Conteúdo 5"/>
+          <p:cNvPicPr>
+            <a:picLocks noGrp="1" noChangeAspect="1"/>
+          </p:cNvPicPr>
+          <p:nvPr>
+            <p:ph sz="half" idx="2"/>
+          </p:nvPr>
+        </p:nvPicPr>
+        <p:blipFill rotWithShape="1">
+          <a:blip r:embed="rId2" cstate="print">
+            <a:extLst>
+              <a:ext uri="{28A0092B-C50C-407E-A947-70E740481C1C}">
+                <a14:useLocalDpi xmlns:a14="http://schemas.microsoft.com/office/drawing/2010/main" val="0"/>
+              </a:ext>
+            </a:extLst>
+          </a:blip>
+          <a:srcRect l="18087" t="8171" r="26449" b="26538"/>
+          <a:stretch/>
+        </p:blipFill>
+        <p:spPr>
+          <a:xfrm>
+            <a:off x="6019799" y="2092427"/>
+            <a:ext cx="5697584" cy="3770866"/>
+          </a:xfrm>
+        </p:spPr>
+      </p:pic>
     </p:spTree>
     <p:extLst>
       <p:ext uri="{BB962C8B-B14F-4D97-AF65-F5344CB8AC3E}">
@@ -15468,16 +15545,29 @@
             </a:r>
             <a:r>
               <a:rPr lang="en-US" dirty="0"/>
-              <a:t>the contribution of each element to this report, the group believes that the work was equally distributed by the five elements, with the exception of Section X. This section, and all the work behind it, was entirely developed by Miguel </a:t>
-            </a:r>
-            <a:r>
-              <a:rPr lang="en-US"/>
-              <a:t>Ferreira</a:t>
-            </a:r>
-            <a:r>
-              <a:rPr lang="en-US" smtClean="0"/>
-              <a:t>.</a:t>
-            </a:r>
+              <a:t>the contribution of each element to this report, the group believes that the work was equally distributed by the five elements, with </a:t>
+            </a:r>
+            <a:r>
+              <a:rPr lang="en-US" dirty="0" smtClean="0"/>
+              <a:t>the exception of </a:t>
+            </a:r>
+            <a:r>
+              <a:rPr lang="en-US" dirty="0" smtClean="0"/>
+              <a:t>the </a:t>
+            </a:r>
+            <a:r>
+              <a:rPr lang="en-US" i="1" dirty="0" err="1" smtClean="0"/>
+              <a:t>Makefile</a:t>
+            </a:r>
+            <a:r>
+              <a:rPr lang="en-US" i="1" dirty="0" smtClean="0"/>
+              <a:t> </a:t>
+            </a:r>
+            <a:r>
+              <a:rPr lang="en-US" dirty="0" smtClean="0"/>
+              <a:t>rule which was implemented by Miguel Ferreira.</a:t>
+            </a:r>
+            <a:endParaRPr lang="en-US" dirty="0" smtClean="0"/>
           </a:p>
           <a:p>
             <a:pPr marL="0" indent="0" algn="just">

</xml_diff>